<commit_message>
Bô sung file powerpoint ModBus
</commit_message>
<xml_diff>
--- a/FW/Tuan/Powerpoint tuần 4/ModBus.pptx
+++ b/FW/Tuan/Powerpoint tuần 4/ModBus.pptx
@@ -5,7 +5,7 @@
     <p:sldMasterId id="2147483648" r:id="rId1"/>
   </p:sldMasterIdLst>
   <p:notesMasterIdLst>
-    <p:notesMasterId r:id="rId13"/>
+    <p:notesMasterId r:id="rId14"/>
   </p:notesMasterIdLst>
   <p:sldIdLst>
     <p:sldId id="256" r:id="rId2"/>
@@ -14,11 +14,12 @@
     <p:sldId id="263" r:id="rId5"/>
     <p:sldId id="264" r:id="rId6"/>
     <p:sldId id="265" r:id="rId7"/>
-    <p:sldId id="266" r:id="rId8"/>
-    <p:sldId id="267" r:id="rId9"/>
-    <p:sldId id="268" r:id="rId10"/>
-    <p:sldId id="269" r:id="rId11"/>
-    <p:sldId id="261" r:id="rId12"/>
+    <p:sldId id="270" r:id="rId8"/>
+    <p:sldId id="266" r:id="rId9"/>
+    <p:sldId id="267" r:id="rId10"/>
+    <p:sldId id="268" r:id="rId11"/>
+    <p:sldId id="269" r:id="rId12"/>
+    <p:sldId id="261" r:id="rId13"/>
   </p:sldIdLst>
   <p:sldSz cx="12192000" cy="6858000"/>
   <p:notesSz cx="6858000" cy="9144000"/>
@@ -218,7 +219,7 @@
           <a:p>
             <a:fld id="{BE921E71-55FB-4F70-BA64-7E87629B9540}" type="datetimeFigureOut">
               <a:rPr lang="en-US" smtClean="0"/>
-              <a:t>8/6/2020</a:t>
+              <a:t>8/7/2020</a:t>
             </a:fld>
             <a:endParaRPr lang="en-US"/>
           </a:p>
@@ -3276,7 +3277,7 @@
           <a:p>
             <a:fld id="{6D9FEF56-C5D4-4D87-B961-211842A8ECEA}" type="datetime1">
               <a:rPr lang="en-US" smtClean="0"/>
-              <a:t>8/6/2020</a:t>
+              <a:t>8/7/2020</a:t>
             </a:fld>
             <a:endParaRPr lang="en-US"/>
           </a:p>
@@ -3782,17 +3783,7 @@
                 <a:latin typeface="Times New Roman" panose="02020603050405020304" pitchFamily="18" charset="0"/>
                 <a:cs typeface="Times New Roman" panose="02020603050405020304" pitchFamily="18" charset="0"/>
               </a:rPr>
-              <a:t>M</a:t>
-            </a:r>
-            <a:r>
-              <a:rPr lang="en-US" sz="5000" b="1" smtClean="0">
-                <a:solidFill>
-                  <a:srgbClr val="FF0000"/>
-                </a:solidFill>
-                <a:latin typeface="Times New Roman" panose="02020603050405020304" pitchFamily="18" charset="0"/>
-                <a:cs typeface="Times New Roman" panose="02020603050405020304" pitchFamily="18" charset="0"/>
-              </a:rPr>
-              <a:t>odbus Converter</a:t>
+              <a:t>Modbus Converter</a:t>
             </a:r>
             <a:endParaRPr lang="en-US" sz="5000" b="1">
               <a:solidFill>
@@ -3812,8 +3803,8 @@
         </p:nvSpPr>
         <p:spPr>
           <a:xfrm>
-            <a:off x="1881352" y="4692075"/>
-            <a:ext cx="10037378" cy="1938992"/>
+            <a:off x="1881353" y="4679334"/>
+            <a:ext cx="10037378" cy="1421992"/>
           </a:xfrm>
           <a:prstGeom prst="rect">
             <a:avLst/>
@@ -3838,6 +3829,182 @@
                 <a:latin typeface="Times New Roman" panose="02020603050405020304" pitchFamily="18" charset="0"/>
                 <a:cs typeface="Times New Roman" panose="02020603050405020304" pitchFamily="18" charset="0"/>
               </a:rPr>
+              <a:t>Như hình trên, chúng ta có thể thấy chỉ với một thiết bị chuyển đổi nhưng đồng thời có thể đọc được đến 8 ngõ vào 4-20mA/0-10V. Và chuyển chúng về tín hiệu </a:t>
+            </a:r>
+            <a:r>
+              <a:rPr lang="vi-VN" sz="2000" b="1">
+                <a:latin typeface="Times New Roman" panose="02020603050405020304" pitchFamily="18" charset="0"/>
+                <a:cs typeface="Times New Roman" panose="02020603050405020304" pitchFamily="18" charset="0"/>
+              </a:rPr>
+              <a:t>modbus RTU</a:t>
+            </a:r>
+            <a:r>
+              <a:rPr lang="vi-VN" sz="2000">
+                <a:latin typeface="Times New Roman" panose="02020603050405020304" pitchFamily="18" charset="0"/>
+                <a:cs typeface="Times New Roman" panose="02020603050405020304" pitchFamily="18" charset="0"/>
+              </a:rPr>
+              <a:t> đưa về PLC điều khiển. Đây có thể được xem là một giải pháp tiết kiệm chi phí và đem lại hiệu quả rất cao.</a:t>
+            </a:r>
+          </a:p>
+        </p:txBody>
+      </p:sp>
+      <p:pic>
+        <p:nvPicPr>
+          <p:cNvPr id="8" name="Picture 7"/>
+          <p:cNvPicPr>
+            <a:picLocks noChangeAspect="1"/>
+          </p:cNvPicPr>
+          <p:nvPr/>
+        </p:nvPicPr>
+        <p:blipFill>
+          <a:blip r:embed="rId2"/>
+          <a:stretch>
+            <a:fillRect/>
+          </a:stretch>
+        </p:blipFill>
+        <p:spPr>
+          <a:xfrm>
+            <a:off x="4213223" y="1832750"/>
+            <a:ext cx="5373638" cy="2653373"/>
+          </a:xfrm>
+          <a:prstGeom prst="rect">
+            <a:avLst/>
+          </a:prstGeom>
+        </p:spPr>
+      </p:pic>
+    </p:spTree>
+    <p:extLst>
+      <p:ext uri="{BB962C8B-B14F-4D97-AF65-F5344CB8AC3E}">
+        <p14:creationId xmlns:p14="http://schemas.microsoft.com/office/powerpoint/2010/main" val="4289905795"/>
+      </p:ext>
+    </p:extLst>
+  </p:cSld>
+  <p:clrMapOvr>
+    <a:masterClrMapping/>
+  </p:clrMapOvr>
+  <p:timing>
+    <p:tnLst>
+      <p:par>
+        <p:cTn id="1" dur="indefinite" restart="never" nodeType="tmRoot"/>
+      </p:par>
+    </p:tnLst>
+  </p:timing>
+</p:sld>
+</file>
+
+<file path=ppt/slides/slide11.xml><?xml version="1.0" encoding="utf-8"?>
+<p:sld xmlns:a="http://schemas.openxmlformats.org/drawingml/2006/main" xmlns:r="http://schemas.openxmlformats.org/officeDocument/2006/relationships" xmlns:p="http://schemas.openxmlformats.org/presentationml/2006/main">
+  <p:cSld>
+    <p:spTree>
+      <p:nvGrpSpPr>
+        <p:cNvPr id="1" name=""/>
+        <p:cNvGrpSpPr/>
+        <p:nvPr/>
+      </p:nvGrpSpPr>
+      <p:grpSpPr>
+        <a:xfrm>
+          <a:off x="0" y="0"/>
+          <a:ext cx="0" cy="0"/>
+          <a:chOff x="0" y="0"/>
+          <a:chExt cx="0" cy="0"/>
+        </a:xfrm>
+      </p:grpSpPr>
+      <p:sp>
+        <p:nvSpPr>
+          <p:cNvPr id="6" name="TextBox 5"/>
+          <p:cNvSpPr txBox="1"/>
+          <p:nvPr/>
+        </p:nvSpPr>
+        <p:spPr>
+          <a:xfrm>
+            <a:off x="2769477" y="777765"/>
+            <a:ext cx="8261130" cy="861774"/>
+          </a:xfrm>
+          <a:prstGeom prst="rect">
+            <a:avLst/>
+          </a:prstGeom>
+          <a:noFill/>
+        </p:spPr>
+        <p:txBody>
+          <a:bodyPr wrap="square" rtlCol="0">
+            <a:spAutoFit/>
+          </a:bodyPr>
+          <a:lstStyle/>
+          <a:p>
+            <a:r>
+              <a:rPr lang="en-US" sz="5000" b="1" smtClean="0">
+                <a:solidFill>
+                  <a:srgbClr val="FF0000"/>
+                </a:solidFill>
+                <a:latin typeface="Times New Roman" panose="02020603050405020304" pitchFamily="18" charset="0"/>
+                <a:cs typeface="Times New Roman" panose="02020603050405020304" pitchFamily="18" charset="0"/>
+              </a:rPr>
+              <a:t>Analog </a:t>
+            </a:r>
+            <a:r>
+              <a:rPr lang="en-US" sz="5000" b="1">
+                <a:solidFill>
+                  <a:srgbClr val="FF0000"/>
+                </a:solidFill>
+                <a:latin typeface="Times New Roman" panose="02020603050405020304" pitchFamily="18" charset="0"/>
+                <a:cs typeface="Times New Roman" panose="02020603050405020304" pitchFamily="18" charset="0"/>
+              </a:rPr>
+              <a:t>to </a:t>
+            </a:r>
+            <a:r>
+              <a:rPr lang="en-US" sz="5000" b="1" smtClean="0">
+                <a:solidFill>
+                  <a:srgbClr val="FF0000"/>
+                </a:solidFill>
+                <a:latin typeface="Times New Roman" panose="02020603050405020304" pitchFamily="18" charset="0"/>
+                <a:cs typeface="Times New Roman" panose="02020603050405020304" pitchFamily="18" charset="0"/>
+              </a:rPr>
+              <a:t>Modbus Converter</a:t>
+            </a:r>
+            <a:endParaRPr lang="en-US" sz="5000" b="1">
+              <a:solidFill>
+                <a:srgbClr val="FF0000"/>
+              </a:solidFill>
+              <a:latin typeface="Times New Roman" panose="02020603050405020304" pitchFamily="18" charset="0"/>
+              <a:cs typeface="Times New Roman" panose="02020603050405020304" pitchFamily="18" charset="0"/>
+            </a:endParaRPr>
+          </a:p>
+        </p:txBody>
+      </p:sp>
+      <p:sp>
+        <p:nvSpPr>
+          <p:cNvPr id="7" name="TextBox 6"/>
+          <p:cNvSpPr txBox="1"/>
+          <p:nvPr/>
+        </p:nvSpPr>
+        <p:spPr>
+          <a:xfrm>
+            <a:off x="1881352" y="4692075"/>
+            <a:ext cx="10037378" cy="1938992"/>
+          </a:xfrm>
+          <a:prstGeom prst="rect">
+            <a:avLst/>
+          </a:prstGeom>
+          <a:solidFill>
+            <a:schemeClr val="bg1"/>
+          </a:solidFill>
+        </p:spPr>
+        <p:txBody>
+          <a:bodyPr wrap="square" rtlCol="0">
+            <a:spAutoFit/>
+          </a:bodyPr>
+          <a:lstStyle/>
+          <a:p>
+            <a:pPr>
+              <a:lnSpc>
+                <a:spcPct val="150000"/>
+              </a:lnSpc>
+            </a:pPr>
+            <a:r>
+              <a:rPr lang="vi-VN" sz="2000">
+                <a:latin typeface="Times New Roman" panose="02020603050405020304" pitchFamily="18" charset="0"/>
+                <a:cs typeface="Times New Roman" panose="02020603050405020304" pitchFamily="18" charset="0"/>
+              </a:rPr>
               <a:t>Ngoài ra, đối với ứng dụng đo nhiệt độ thì còn có </a:t>
             </a:r>
             <a:r>
@@ -3845,112 +4012,91 @@
                 <a:latin typeface="Times New Roman" panose="02020603050405020304" pitchFamily="18" charset="0"/>
                 <a:cs typeface="Times New Roman" panose="02020603050405020304" pitchFamily="18" charset="0"/>
               </a:rPr>
-              <a:t>bộ chuyển </a:t>
+              <a:t>bộ chuyển đổi </a:t>
+            </a:r>
+            <a:r>
+              <a:rPr lang="en-US" sz="2000" b="1" smtClean="0">
+                <a:latin typeface="Times New Roman" panose="02020603050405020304" pitchFamily="18" charset="0"/>
+                <a:cs typeface="Times New Roman" panose="02020603050405020304" pitchFamily="18" charset="0"/>
+              </a:rPr>
+              <a:t>PT</a:t>
+            </a:r>
+            <a:r>
+              <a:rPr lang="vi-VN" sz="2000" b="1" smtClean="0">
+                <a:latin typeface="Times New Roman" panose="02020603050405020304" pitchFamily="18" charset="0"/>
+                <a:cs typeface="Times New Roman" panose="02020603050405020304" pitchFamily="18" charset="0"/>
+              </a:rPr>
+              <a:t>100 </a:t>
             </a:r>
             <a:r>
               <a:rPr lang="vi-VN" sz="2000" b="1">
                 <a:latin typeface="Times New Roman" panose="02020603050405020304" pitchFamily="18" charset="0"/>
                 <a:cs typeface="Times New Roman" panose="02020603050405020304" pitchFamily="18" charset="0"/>
               </a:rPr>
-              <a:t>đổi </a:t>
+              <a:t>ra </a:t>
             </a:r>
             <a:r>
               <a:rPr lang="en-US" sz="2000" b="1" smtClean="0">
                 <a:latin typeface="Times New Roman" panose="02020603050405020304" pitchFamily="18" charset="0"/>
                 <a:cs typeface="Times New Roman" panose="02020603050405020304" pitchFamily="18" charset="0"/>
               </a:rPr>
+              <a:t>M</a:t>
+            </a:r>
+            <a:r>
+              <a:rPr lang="vi-VN" sz="2000" b="1" smtClean="0">
+                <a:latin typeface="Times New Roman" panose="02020603050405020304" pitchFamily="18" charset="0"/>
+                <a:cs typeface="Times New Roman" panose="02020603050405020304" pitchFamily="18" charset="0"/>
+              </a:rPr>
+              <a:t>od</a:t>
+            </a:r>
+            <a:r>
+              <a:rPr lang="en-US" sz="2000" b="1" smtClean="0">
+                <a:latin typeface="Times New Roman" panose="02020603050405020304" pitchFamily="18" charset="0"/>
+                <a:cs typeface="Times New Roman" panose="02020603050405020304" pitchFamily="18" charset="0"/>
+              </a:rPr>
+              <a:t>B</a:t>
+            </a:r>
+            <a:r>
+              <a:rPr lang="vi-VN" sz="2000" b="1" smtClean="0">
+                <a:latin typeface="Times New Roman" panose="02020603050405020304" pitchFamily="18" charset="0"/>
+                <a:cs typeface="Times New Roman" panose="02020603050405020304" pitchFamily="18" charset="0"/>
+              </a:rPr>
+              <a:t>us </a:t>
+            </a:r>
+            <a:r>
+              <a:rPr lang="en-US" sz="2000" b="1" smtClean="0">
+                <a:latin typeface="Times New Roman" panose="02020603050405020304" pitchFamily="18" charset="0"/>
+                <a:cs typeface="Times New Roman" panose="02020603050405020304" pitchFamily="18" charset="0"/>
+              </a:rPr>
+              <a:t>RTU</a:t>
+            </a:r>
+            <a:r>
+              <a:rPr lang="vi-VN" sz="2000">
+                <a:latin typeface="Times New Roman" panose="02020603050405020304" pitchFamily="18" charset="0"/>
+                <a:cs typeface="Times New Roman" panose="02020603050405020304" pitchFamily="18" charset="0"/>
+              </a:rPr>
+              <a:t> như hình trên. Tín hiệu ngõ vào là 4 </a:t>
+            </a:r>
+            <a:r>
+              <a:rPr lang="en-US" sz="2000" smtClean="0">
+                <a:latin typeface="Times New Roman" panose="02020603050405020304" pitchFamily="18" charset="0"/>
+                <a:cs typeface="Times New Roman" panose="02020603050405020304" pitchFamily="18" charset="0"/>
+              </a:rPr>
               <a:t>PT</a:t>
             </a:r>
             <a:r>
-              <a:rPr lang="vi-VN" sz="2000" b="1" smtClean="0">
+              <a:rPr lang="vi-VN" sz="2000" smtClean="0">
                 <a:latin typeface="Times New Roman" panose="02020603050405020304" pitchFamily="18" charset="0"/>
                 <a:cs typeface="Times New Roman" panose="02020603050405020304" pitchFamily="18" charset="0"/>
               </a:rPr>
               <a:t>100 </a:t>
             </a:r>
             <a:r>
-              <a:rPr lang="vi-VN" sz="2000" b="1">
-                <a:latin typeface="Times New Roman" panose="02020603050405020304" pitchFamily="18" charset="0"/>
-                <a:cs typeface="Times New Roman" panose="02020603050405020304" pitchFamily="18" charset="0"/>
-              </a:rPr>
-              <a:t>ra </a:t>
-            </a:r>
-            <a:r>
-              <a:rPr lang="en-US" sz="2000" b="1" smtClean="0">
-                <a:latin typeface="Times New Roman" panose="02020603050405020304" pitchFamily="18" charset="0"/>
-                <a:cs typeface="Times New Roman" panose="02020603050405020304" pitchFamily="18" charset="0"/>
-              </a:rPr>
-              <a:t>M</a:t>
-            </a:r>
-            <a:r>
-              <a:rPr lang="vi-VN" sz="2000" b="1" smtClean="0">
-                <a:latin typeface="Times New Roman" panose="02020603050405020304" pitchFamily="18" charset="0"/>
-                <a:cs typeface="Times New Roman" panose="02020603050405020304" pitchFamily="18" charset="0"/>
-              </a:rPr>
-              <a:t>od</a:t>
-            </a:r>
-            <a:r>
-              <a:rPr lang="en-US" sz="2000" b="1" smtClean="0">
-                <a:latin typeface="Times New Roman" panose="02020603050405020304" pitchFamily="18" charset="0"/>
-                <a:cs typeface="Times New Roman" panose="02020603050405020304" pitchFamily="18" charset="0"/>
-              </a:rPr>
-              <a:t>B</a:t>
-            </a:r>
-            <a:r>
-              <a:rPr lang="vi-VN" sz="2000" b="1" smtClean="0">
-                <a:latin typeface="Times New Roman" panose="02020603050405020304" pitchFamily="18" charset="0"/>
-                <a:cs typeface="Times New Roman" panose="02020603050405020304" pitchFamily="18" charset="0"/>
-              </a:rPr>
-              <a:t>us </a:t>
-            </a:r>
-            <a:r>
-              <a:rPr lang="en-US" sz="2000" b="1" smtClean="0">
-                <a:latin typeface="Times New Roman" panose="02020603050405020304" pitchFamily="18" charset="0"/>
-                <a:cs typeface="Times New Roman" panose="02020603050405020304" pitchFamily="18" charset="0"/>
-              </a:rPr>
-              <a:t>RTU</a:t>
-            </a:r>
-            <a:r>
               <a:rPr lang="vi-VN" sz="2000">
                 <a:latin typeface="Times New Roman" panose="02020603050405020304" pitchFamily="18" charset="0"/>
                 <a:cs typeface="Times New Roman" panose="02020603050405020304" pitchFamily="18" charset="0"/>
               </a:rPr>
-              <a:t> như hình trên. Tín hiệu ngõ vào là </a:t>
-            </a:r>
-            <a:r>
-              <a:rPr lang="vi-VN" sz="2000">
-                <a:latin typeface="Times New Roman" panose="02020603050405020304" pitchFamily="18" charset="0"/>
-                <a:cs typeface="Times New Roman" panose="02020603050405020304" pitchFamily="18" charset="0"/>
-              </a:rPr>
-              <a:t>4 </a:t>
-            </a:r>
-            <a:r>
-              <a:rPr lang="en-US" sz="2000" smtClean="0">
-                <a:latin typeface="Times New Roman" panose="02020603050405020304" pitchFamily="18" charset="0"/>
-                <a:cs typeface="Times New Roman" panose="02020603050405020304" pitchFamily="18" charset="0"/>
-              </a:rPr>
-              <a:t>PT</a:t>
-            </a:r>
-            <a:r>
-              <a:rPr lang="vi-VN" sz="2000" smtClean="0">
-                <a:latin typeface="Times New Roman" panose="02020603050405020304" pitchFamily="18" charset="0"/>
-                <a:cs typeface="Times New Roman" panose="02020603050405020304" pitchFamily="18" charset="0"/>
-              </a:rPr>
-              <a:t>100 </a:t>
-            </a:r>
-            <a:r>
-              <a:rPr lang="vi-VN" sz="2000">
-                <a:latin typeface="Times New Roman" panose="02020603050405020304" pitchFamily="18" charset="0"/>
-                <a:cs typeface="Times New Roman" panose="02020603050405020304" pitchFamily="18" charset="0"/>
-              </a:rPr>
-              <a:t>sẽ được bộ chuyển đổi đưa về dạng Modbus RTU. Nếu không sử dụng đến thiết bị chuyển sang modbus thì chúng ta phải sử dụng đến 4 bộ chuyển </a:t>
-            </a:r>
-            <a:r>
-              <a:rPr lang="vi-VN" sz="2000">
-                <a:latin typeface="Times New Roman" panose="02020603050405020304" pitchFamily="18" charset="0"/>
-                <a:cs typeface="Times New Roman" panose="02020603050405020304" pitchFamily="18" charset="0"/>
-              </a:rPr>
-              <a:t>đổi </a:t>
+              <a:t>sẽ được bộ chuyển đổi đưa về dạng Modbus RTU. Nếu không sử dụng đến thiết bị chuyển sang modbus thì chúng ta phải sử dụng đến 4 bộ chuyển đổi </a:t>
             </a:r>
             <a:r>
               <a:rPr lang="en-US" sz="2000" smtClean="0">
@@ -4020,7 +4166,7 @@
 </p:sld>
 </file>
 
-<file path=ppt/slides/slide11.xml><?xml version="1.0" encoding="utf-8"?>
+<file path=ppt/slides/slide12.xml><?xml version="1.0" encoding="utf-8"?>
 <p:sld xmlns:a="http://schemas.openxmlformats.org/drawingml/2006/main" xmlns:r="http://schemas.openxmlformats.org/officeDocument/2006/relationships" xmlns:p="http://schemas.openxmlformats.org/presentationml/2006/main">
   <p:cSld>
     <p:spTree>
@@ -4707,14 +4853,7 @@
                 <a:latin typeface="Times New Roman" panose="02020603050405020304" pitchFamily="18" charset="0"/>
                 <a:cs typeface="Times New Roman" panose="02020603050405020304" pitchFamily="18" charset="0"/>
               </a:rPr>
-              <a:t>giao thức modbus là một hệ thống gồm nhiều thiết bị sử dụng cùng một giao thức để nói chuyện với nhau thông qua một cặp dây xoắn </a:t>
-            </a:r>
-            <a:r>
-              <a:rPr lang="vi-VN" sz="2500">
-                <a:latin typeface="Times New Roman" panose="02020603050405020304" pitchFamily="18" charset="0"/>
-                <a:cs typeface="Times New Roman" panose="02020603050405020304" pitchFamily="18" charset="0"/>
-              </a:rPr>
-              <a:t>đơn</a:t>
+              <a:t>giao thức modbus là một hệ thống gồm nhiều thiết bị sử dụng cùng một giao thức để nói chuyện với nhau thông qua một cặp dây xoắn đơn</a:t>
             </a:r>
             <a:r>
               <a:rPr lang="vi-VN" sz="2500" smtClean="0">
@@ -4775,14 +4914,7 @@
                 <a:latin typeface="Times New Roman" panose="02020603050405020304" pitchFamily="18" charset="0"/>
                 <a:cs typeface="Times New Roman" panose="02020603050405020304" pitchFamily="18" charset="0"/>
               </a:rPr>
-              <a:t>điểm là độ chính xác rất cao, không bị nhiễu khi truyền đi xa, có khả năng </a:t>
-            </a:r>
-            <a:r>
-              <a:rPr lang="vi-VN" sz="2500">
-                <a:latin typeface="Times New Roman" panose="02020603050405020304" pitchFamily="18" charset="0"/>
-                <a:cs typeface="Times New Roman" panose="02020603050405020304" pitchFamily="18" charset="0"/>
-              </a:rPr>
-              <a:t>sửa </a:t>
+              <a:t>điểm là độ chính xác rất cao, không bị nhiễu khi truyền đi xa, có khả năng sửa </a:t>
             </a:r>
             <a:r>
               <a:rPr lang="vi-VN" sz="2500" smtClean="0">
@@ -4944,98 +5076,70 @@
                 <a:latin typeface="Times New Roman" panose="02020603050405020304" pitchFamily="18" charset="0"/>
                 <a:cs typeface="Times New Roman" panose="02020603050405020304" pitchFamily="18" charset="0"/>
               </a:rPr>
-              <a:t>liệu được mã hóa theo hệ nhị phân, và chỉ cần một byte truyền thông cho một byte dữ liệu. Đây là thiết bị lí tưởng đối </a:t>
+              <a:t>liệu được mã hóa theo hệ nhị phân, và chỉ cần một byte truyền thông cho một byte dữ liệu. Đây là thiết bị lí tưởng đối với </a:t>
+            </a:r>
+            <a:r>
+              <a:rPr lang="vi-VN" sz="2000" smtClean="0">
+                <a:latin typeface="Times New Roman" panose="02020603050405020304" pitchFamily="18" charset="0"/>
+                <a:cs typeface="Times New Roman" panose="02020603050405020304" pitchFamily="18" charset="0"/>
+              </a:rPr>
+              <a:t>RS232 </a:t>
             </a:r>
             <a:r>
               <a:rPr lang="vi-VN" sz="2000">
                 <a:latin typeface="Times New Roman" panose="02020603050405020304" pitchFamily="18" charset="0"/>
                 <a:cs typeface="Times New Roman" panose="02020603050405020304" pitchFamily="18" charset="0"/>
               </a:rPr>
-              <a:t>với </a:t>
+              <a:t>hay mạng RS485 đa </a:t>
             </a:r>
             <a:r>
               <a:rPr lang="vi-VN" sz="2000" smtClean="0">
                 <a:latin typeface="Times New Roman" panose="02020603050405020304" pitchFamily="18" charset="0"/>
                 <a:cs typeface="Times New Roman" panose="02020603050405020304" pitchFamily="18" charset="0"/>
               </a:rPr>
-              <a:t>RS232 </a:t>
+              <a:t>điểm</a:t>
+            </a:r>
+            <a:r>
+              <a:rPr lang="en-US" sz="2000">
+                <a:latin typeface="Times New Roman" panose="02020603050405020304" pitchFamily="18" charset="0"/>
+                <a:cs typeface="Times New Roman" panose="02020603050405020304" pitchFamily="18" charset="0"/>
+              </a:rPr>
+              <a:t> tốc độ từ 1200 baud đến 19200 </a:t>
+            </a:r>
+            <a:r>
+              <a:rPr lang="en-US" sz="2000" smtClean="0">
+                <a:latin typeface="Times New Roman" panose="02020603050405020304" pitchFamily="18" charset="0"/>
+                <a:cs typeface="Times New Roman" panose="02020603050405020304" pitchFamily="18" charset="0"/>
+              </a:rPr>
+              <a:t>baud</a:t>
+            </a:r>
+            <a:r>
+              <a:rPr lang="en-US" sz="2000">
+                <a:latin typeface="Times New Roman" panose="02020603050405020304" pitchFamily="18" charset="0"/>
+                <a:cs typeface="Times New Roman" panose="02020603050405020304" pitchFamily="18" charset="0"/>
+              </a:rPr>
+              <a:t>,</a:t>
+            </a:r>
+            <a:r>
+              <a:rPr lang="en-US" sz="2000" smtClean="0">
+                <a:latin typeface="Times New Roman" panose="02020603050405020304" pitchFamily="18" charset="0"/>
+                <a:cs typeface="Times New Roman" panose="02020603050405020304" pitchFamily="18" charset="0"/>
+              </a:rPr>
+              <a:t> t</a:t>
+            </a:r>
+            <a:r>
+              <a:rPr lang="vi-VN" sz="2000" smtClean="0">
+                <a:latin typeface="Times New Roman" panose="02020603050405020304" pitchFamily="18" charset="0"/>
+                <a:cs typeface="Times New Roman" panose="02020603050405020304" pitchFamily="18" charset="0"/>
+              </a:rPr>
+              <a:t>ốc </a:t>
             </a:r>
             <a:r>
               <a:rPr lang="vi-VN" sz="2000">
                 <a:latin typeface="Times New Roman" panose="02020603050405020304" pitchFamily="18" charset="0"/>
                 <a:cs typeface="Times New Roman" panose="02020603050405020304" pitchFamily="18" charset="0"/>
               </a:rPr>
-              <a:t>hay mạng RS485 </a:t>
-            </a:r>
-            <a:r>
-              <a:rPr lang="vi-VN" sz="2000">
-                <a:latin typeface="Times New Roman" panose="02020603050405020304" pitchFamily="18" charset="0"/>
-                <a:cs typeface="Times New Roman" panose="02020603050405020304" pitchFamily="18" charset="0"/>
-              </a:rPr>
-              <a:t>đa </a:t>
-            </a:r>
-            <a:r>
-              <a:rPr lang="vi-VN" sz="2000" smtClean="0">
-                <a:latin typeface="Times New Roman" panose="02020603050405020304" pitchFamily="18" charset="0"/>
-                <a:cs typeface="Times New Roman" panose="02020603050405020304" pitchFamily="18" charset="0"/>
-              </a:rPr>
-              <a:t>điểm</a:t>
-            </a:r>
-            <a:r>
-              <a:rPr lang="en-US" sz="2000">
-                <a:latin typeface="Times New Roman" panose="02020603050405020304" pitchFamily="18" charset="0"/>
-                <a:cs typeface="Times New Roman" panose="02020603050405020304" pitchFamily="18" charset="0"/>
-              </a:rPr>
-              <a:t> tốc độ từ 1200 baud đến </a:t>
-            </a:r>
-            <a:r>
-              <a:rPr lang="en-US" sz="2000">
-                <a:latin typeface="Times New Roman" panose="02020603050405020304" pitchFamily="18" charset="0"/>
-                <a:cs typeface="Times New Roman" panose="02020603050405020304" pitchFamily="18" charset="0"/>
-              </a:rPr>
-              <a:t>19200 </a:t>
-            </a:r>
-            <a:r>
-              <a:rPr lang="en-US" sz="2000" smtClean="0">
-                <a:latin typeface="Times New Roman" panose="02020603050405020304" pitchFamily="18" charset="0"/>
-                <a:cs typeface="Times New Roman" panose="02020603050405020304" pitchFamily="18" charset="0"/>
-              </a:rPr>
-              <a:t>baud</a:t>
-            </a:r>
-            <a:r>
-              <a:rPr lang="en-US" sz="2000">
-                <a:latin typeface="Times New Roman" panose="02020603050405020304" pitchFamily="18" charset="0"/>
-                <a:cs typeface="Times New Roman" panose="02020603050405020304" pitchFamily="18" charset="0"/>
-              </a:rPr>
-              <a:t>,</a:t>
-            </a:r>
-            <a:r>
-              <a:rPr lang="en-US" sz="2000" smtClean="0">
-                <a:latin typeface="Times New Roman" panose="02020603050405020304" pitchFamily="18" charset="0"/>
-                <a:cs typeface="Times New Roman" panose="02020603050405020304" pitchFamily="18" charset="0"/>
-              </a:rPr>
-              <a:t> t</a:t>
-            </a:r>
-            <a:r>
-              <a:rPr lang="vi-VN" sz="2000" smtClean="0">
-                <a:latin typeface="Times New Roman" panose="02020603050405020304" pitchFamily="18" charset="0"/>
-                <a:cs typeface="Times New Roman" panose="02020603050405020304" pitchFamily="18" charset="0"/>
-              </a:rPr>
-              <a:t>ốc </a:t>
-            </a:r>
-            <a:r>
-              <a:rPr lang="vi-VN" sz="2000">
-                <a:latin typeface="Times New Roman" panose="02020603050405020304" pitchFamily="18" charset="0"/>
-                <a:cs typeface="Times New Roman" panose="02020603050405020304" pitchFamily="18" charset="0"/>
-              </a:rPr>
-              <a:t>độ phổ biến nhất </a:t>
-            </a:r>
-            <a:r>
-              <a:rPr lang="vi-VN" sz="2000">
-                <a:latin typeface="Times New Roman" panose="02020603050405020304" pitchFamily="18" charset="0"/>
-                <a:cs typeface="Times New Roman" panose="02020603050405020304" pitchFamily="18" charset="0"/>
-              </a:rPr>
-              <a:t>là </a:t>
+              <a:t>độ phổ biến nhất là </a:t>
             </a:r>
             <a:r>
               <a:rPr lang="vi-VN" sz="2000" smtClean="0">
@@ -5116,14 +5220,7 @@
                 <a:latin typeface="Times New Roman" panose="02020603050405020304" pitchFamily="18" charset="0"/>
                 <a:cs typeface="Times New Roman" panose="02020603050405020304" pitchFamily="18" charset="0"/>
               </a:rPr>
-              <a:t>Modbus RTU</a:t>
-            </a:r>
-            <a:r>
-              <a:rPr lang="vi-VN" sz="2500" b="1">
-                <a:latin typeface="Times New Roman" panose="02020603050405020304" pitchFamily="18" charset="0"/>
-                <a:cs typeface="Times New Roman" panose="02020603050405020304" pitchFamily="18" charset="0"/>
-              </a:rPr>
-              <a:t>: </a:t>
+              <a:t>Modbus RTU: </a:t>
             </a:r>
             <a:endParaRPr lang="en-US" sz="2500" b="1">
               <a:latin typeface="Times New Roman" panose="02020603050405020304" pitchFamily="18" charset="0"/>
@@ -5250,77 +5347,49 @@
                 <a:latin typeface="Times New Roman" panose="02020603050405020304" pitchFamily="18" charset="0"/>
                 <a:cs typeface="Times New Roman" panose="02020603050405020304" pitchFamily="18" charset="0"/>
               </a:rPr>
-              <a:t>thông điệp được mã hóa </a:t>
+              <a:t>thông điệp được mã hóa bằng </a:t>
+            </a:r>
+            <a:r>
+              <a:rPr lang="vi-VN" sz="2000" smtClean="0">
+                <a:latin typeface="Times New Roman" panose="02020603050405020304" pitchFamily="18" charset="0"/>
+                <a:cs typeface="Times New Roman" panose="02020603050405020304" pitchFamily="18" charset="0"/>
+              </a:rPr>
+              <a:t>hexadecimal</a:t>
             </a:r>
             <a:r>
               <a:rPr lang="vi-VN" sz="2000">
                 <a:latin typeface="Times New Roman" panose="02020603050405020304" pitchFamily="18" charset="0"/>
                 <a:cs typeface="Times New Roman" panose="02020603050405020304" pitchFamily="18" charset="0"/>
               </a:rPr>
-              <a:t>bằng </a:t>
+              <a:t>, sử dụng đặc tính ASCII 4 bit. Đối với mỗi một byte thông tin, cần có 2 byte truyền thông, gấp đôi so với MODBUS RTU hay MODBUS/TCP. Tuy nhiên, MODBUS </a:t>
             </a:r>
             <a:r>
               <a:rPr lang="vi-VN" sz="2000" smtClean="0">
                 <a:latin typeface="Times New Roman" panose="02020603050405020304" pitchFamily="18" charset="0"/>
                 <a:cs typeface="Times New Roman" panose="02020603050405020304" pitchFamily="18" charset="0"/>
               </a:rPr>
-              <a:t>hexadecimal</a:t>
+              <a:t>ASCII </a:t>
             </a:r>
             <a:r>
               <a:rPr lang="vi-VN" sz="2000">
                 <a:latin typeface="Times New Roman" panose="02020603050405020304" pitchFamily="18" charset="0"/>
                 <a:cs typeface="Times New Roman" panose="02020603050405020304" pitchFamily="18" charset="0"/>
               </a:rPr>
-              <a:t>, sử dụng đặc tính ASCII 4 bit. Đối với mỗi một byte thông tin, cần có 2 byte truyền thông, gấp đôi so với MODBUS RTU hay MODBUS/TCP. Tuy nhiên, </a:t>
+              <a:t>chậm nhất trong số 3 loại protocol, nhưng lại thích hợp khi modem điện thoại hay kết nối sử dụng sóng radio do </a:t>
+            </a:r>
+            <a:r>
+              <a:rPr lang="vi-VN" sz="2000" smtClean="0">
+                <a:latin typeface="Times New Roman" panose="02020603050405020304" pitchFamily="18" charset="0"/>
+                <a:cs typeface="Times New Roman" panose="02020603050405020304" pitchFamily="18" charset="0"/>
+              </a:rPr>
+              <a:t>ASCII </a:t>
             </a:r>
             <a:r>
               <a:rPr lang="vi-VN" sz="2000">
                 <a:latin typeface="Times New Roman" panose="02020603050405020304" pitchFamily="18" charset="0"/>
                 <a:cs typeface="Times New Roman" panose="02020603050405020304" pitchFamily="18" charset="0"/>
               </a:rPr>
-              <a:t>MODBUS </a:t>
-            </a:r>
-            <a:r>
-              <a:rPr lang="vi-VN" sz="2000" smtClean="0">
-                <a:latin typeface="Times New Roman" panose="02020603050405020304" pitchFamily="18" charset="0"/>
-                <a:cs typeface="Times New Roman" panose="02020603050405020304" pitchFamily="18" charset="0"/>
-              </a:rPr>
-              <a:t>ASCII </a:t>
-            </a:r>
-            <a:r>
-              <a:rPr lang="vi-VN" sz="2000">
-                <a:latin typeface="Times New Roman" panose="02020603050405020304" pitchFamily="18" charset="0"/>
-                <a:cs typeface="Times New Roman" panose="02020603050405020304" pitchFamily="18" charset="0"/>
-              </a:rPr>
-              <a:t>chậm nhất trong số 3 loại protocol, nhưng lại thích hợp khi modem điện thoại hay kết nối sử dụng sóng radio </a:t>
-            </a:r>
-            <a:r>
-              <a:rPr lang="vi-VN" sz="2000">
-                <a:latin typeface="Times New Roman" panose="02020603050405020304" pitchFamily="18" charset="0"/>
-                <a:cs typeface="Times New Roman" panose="02020603050405020304" pitchFamily="18" charset="0"/>
-              </a:rPr>
-              <a:t>do </a:t>
-            </a:r>
-            <a:r>
-              <a:rPr lang="vi-VN" sz="2000" smtClean="0">
-                <a:latin typeface="Times New Roman" panose="02020603050405020304" pitchFamily="18" charset="0"/>
-                <a:cs typeface="Times New Roman" panose="02020603050405020304" pitchFamily="18" charset="0"/>
-              </a:rPr>
-              <a:t>ASCII </a:t>
-            </a:r>
-            <a:r>
-              <a:rPr lang="vi-VN" sz="2000">
-                <a:latin typeface="Times New Roman" panose="02020603050405020304" pitchFamily="18" charset="0"/>
-                <a:cs typeface="Times New Roman" panose="02020603050405020304" pitchFamily="18" charset="0"/>
-              </a:rPr>
-              <a:t>sử dụng các tính năng phân định thông điệp. Do tính năng phân định này, mọi rắc rối trong phương tiện truyền dẫn sẽ không làm thiết bị </a:t>
-            </a:r>
-            <a:r>
-              <a:rPr lang="vi-VN" sz="2000">
-                <a:latin typeface="Times New Roman" panose="02020603050405020304" pitchFamily="18" charset="0"/>
-                <a:cs typeface="Times New Roman" panose="02020603050405020304" pitchFamily="18" charset="0"/>
-              </a:rPr>
-              <a:t>nhận </a:t>
+              <a:t>sử dụng các tính năng phân định thông điệp. Do tính năng phân định này, mọi rắc rối trong phương tiện truyền dẫn sẽ không làm thiết bị nhận </a:t>
             </a:r>
             <a:r>
               <a:rPr lang="en-US" sz="2000">
@@ -5648,8 +5717,8 @@
         </p:nvSpPr>
         <p:spPr>
           <a:xfrm>
-            <a:off x="4461641" y="105103"/>
-            <a:ext cx="5150069" cy="861774"/>
+            <a:off x="2772318" y="130429"/>
+            <a:ext cx="8040413" cy="861774"/>
           </a:xfrm>
           <a:prstGeom prst="rect">
             <a:avLst/>
@@ -5670,7 +5739,7 @@
                 <a:latin typeface="Times New Roman" panose="02020603050405020304" pitchFamily="18" charset="0"/>
                 <a:cs typeface="Times New Roman" panose="02020603050405020304" pitchFamily="18" charset="0"/>
               </a:rPr>
-              <a:t>ModBus Gateway</a:t>
+              <a:t>Chuẩn ModBus Thông Dụng</a:t>
             </a:r>
             <a:endParaRPr lang="en-US" sz="5000" b="1">
               <a:solidFill>
@@ -5690,8 +5759,168 @@
         </p:nvSpPr>
         <p:spPr>
           <a:xfrm>
-            <a:off x="1797270" y="966877"/>
-            <a:ext cx="10037378" cy="3323987"/>
+            <a:off x="1944413" y="1874497"/>
+            <a:ext cx="10037378" cy="2054409"/>
+          </a:xfrm>
+          <a:prstGeom prst="rect">
+            <a:avLst/>
+          </a:prstGeom>
+          <a:noFill/>
+        </p:spPr>
+        <p:txBody>
+          <a:bodyPr wrap="square" rtlCol="0">
+            <a:spAutoFit/>
+          </a:bodyPr>
+          <a:lstStyle/>
+          <a:p>
+            <a:pPr>
+              <a:lnSpc>
+                <a:spcPct val="150000"/>
+              </a:lnSpc>
+            </a:pPr>
+            <a:r>
+              <a:rPr lang="en-US" sz="2500" b="1" smtClean="0">
+                <a:latin typeface="Times New Roman" panose="02020603050405020304" pitchFamily="18" charset="0"/>
+                <a:cs typeface="Times New Roman" panose="02020603050405020304" pitchFamily="18" charset="0"/>
+              </a:rPr>
+              <a:t>Mã hóa dữ liệu:</a:t>
+            </a:r>
+          </a:p>
+          <a:p>
+            <a:pPr>
+              <a:lnSpc>
+                <a:spcPct val="150000"/>
+              </a:lnSpc>
+            </a:pPr>
+            <a:r>
+              <a:rPr lang="vi-VN" sz="2000" smtClean="0">
+                <a:latin typeface="Times New Roman" panose="02020603050405020304" pitchFamily="18" charset="0"/>
+                <a:cs typeface="Times New Roman" panose="02020603050405020304" pitchFamily="18" charset="0"/>
+              </a:rPr>
+              <a:t>MODBUS </a:t>
+            </a:r>
+            <a:r>
+              <a:rPr lang="vi-VN" sz="2000">
+                <a:latin typeface="Times New Roman" panose="02020603050405020304" pitchFamily="18" charset="0"/>
+                <a:cs typeface="Times New Roman" panose="02020603050405020304" pitchFamily="18" charset="0"/>
+              </a:rPr>
+              <a:t>sử </a:t>
+            </a:r>
+            <a:r>
+              <a:rPr lang="vi-VN" sz="2000">
+                <a:latin typeface="Times New Roman" panose="02020603050405020304" pitchFamily="18" charset="0"/>
+                <a:cs typeface="Times New Roman" panose="02020603050405020304" pitchFamily="18" charset="0"/>
+              </a:rPr>
+              <a:t>dụng </a:t>
+            </a:r>
+            <a:r>
+              <a:rPr lang="en-US" sz="2000" smtClean="0">
+                <a:latin typeface="Times New Roman" panose="02020603050405020304" pitchFamily="18" charset="0"/>
+                <a:cs typeface="Times New Roman" panose="02020603050405020304" pitchFamily="18" charset="0"/>
+              </a:rPr>
+              <a:t>“</a:t>
+            </a:r>
+            <a:r>
+              <a:rPr lang="vi-VN" sz="2000" smtClean="0">
+                <a:latin typeface="Times New Roman" panose="02020603050405020304" pitchFamily="18" charset="0"/>
+                <a:cs typeface="Times New Roman" panose="02020603050405020304" pitchFamily="18" charset="0"/>
+              </a:rPr>
+              <a:t>big-endian</a:t>
+            </a:r>
+            <a:r>
+              <a:rPr lang="en-US" sz="2000" smtClean="0">
+                <a:latin typeface="Times New Roman" panose="02020603050405020304" pitchFamily="18" charset="0"/>
+                <a:cs typeface="Times New Roman" panose="02020603050405020304" pitchFamily="18" charset="0"/>
+              </a:rPr>
+              <a:t>” làm </a:t>
+            </a:r>
+            <a:r>
+              <a:rPr lang="vi-VN" sz="2000">
+                <a:latin typeface="Times New Roman" panose="02020603050405020304" pitchFamily="18" charset="0"/>
+                <a:cs typeface="Times New Roman" panose="02020603050405020304" pitchFamily="18" charset="0"/>
+              </a:rPr>
+              <a:t>đại diện</a:t>
+            </a:r>
+            <a:r>
+              <a:rPr lang="vi-VN" sz="2000" smtClean="0">
+                <a:latin typeface="Times New Roman" panose="02020603050405020304" pitchFamily="18" charset="0"/>
+                <a:cs typeface="Times New Roman" panose="02020603050405020304" pitchFamily="18" charset="0"/>
+              </a:rPr>
+              <a:t> </a:t>
+            </a:r>
+            <a:r>
+              <a:rPr lang="vi-VN" sz="2000">
+                <a:latin typeface="Times New Roman" panose="02020603050405020304" pitchFamily="18" charset="0"/>
+                <a:cs typeface="Times New Roman" panose="02020603050405020304" pitchFamily="18" charset="0"/>
+              </a:rPr>
+              <a:t>cho các địa chỉ </a:t>
+            </a:r>
+            <a:r>
+              <a:rPr lang="vi-VN" sz="2000">
+                <a:latin typeface="Times New Roman" panose="02020603050405020304" pitchFamily="18" charset="0"/>
+                <a:cs typeface="Times New Roman" panose="02020603050405020304" pitchFamily="18" charset="0"/>
+              </a:rPr>
+              <a:t>và </a:t>
+            </a:r>
+            <a:r>
+              <a:rPr lang="vi-VN" sz="2000" smtClean="0">
+                <a:latin typeface="Times New Roman" panose="02020603050405020304" pitchFamily="18" charset="0"/>
+                <a:cs typeface="Times New Roman" panose="02020603050405020304" pitchFamily="18" charset="0"/>
+              </a:rPr>
+              <a:t>dữ </a:t>
+            </a:r>
+            <a:r>
+              <a:rPr lang="vi-VN" sz="2000">
+                <a:latin typeface="Times New Roman" panose="02020603050405020304" pitchFamily="18" charset="0"/>
+                <a:cs typeface="Times New Roman" panose="02020603050405020304" pitchFamily="18" charset="0"/>
+              </a:rPr>
+              <a:t>liệu. Điều này có nghĩa là khi một số lượng lớn hơn một byte đơn được truyền đi, byte quan </a:t>
+            </a:r>
+            <a:r>
+              <a:rPr lang="vi-VN" sz="2000">
+                <a:latin typeface="Times New Roman" panose="02020603050405020304" pitchFamily="18" charset="0"/>
+                <a:cs typeface="Times New Roman" panose="02020603050405020304" pitchFamily="18" charset="0"/>
+              </a:rPr>
+              <a:t>trọng </a:t>
+            </a:r>
+            <a:r>
+              <a:rPr lang="en-US" sz="2000" smtClean="0">
+                <a:latin typeface="Times New Roman" panose="02020603050405020304" pitchFamily="18" charset="0"/>
+                <a:cs typeface="Times New Roman" panose="02020603050405020304" pitchFamily="18" charset="0"/>
+              </a:rPr>
+              <a:t>nhất</a:t>
+            </a:r>
+            <a:r>
+              <a:rPr lang="vi-VN" sz="2000" smtClean="0">
+                <a:latin typeface="Times New Roman" panose="02020603050405020304" pitchFamily="18" charset="0"/>
+                <a:cs typeface="Times New Roman" panose="02020603050405020304" pitchFamily="18" charset="0"/>
+              </a:rPr>
+              <a:t> </a:t>
+            </a:r>
+            <a:r>
+              <a:rPr lang="vi-VN" sz="2000">
+                <a:latin typeface="Times New Roman" panose="02020603050405020304" pitchFamily="18" charset="0"/>
+                <a:cs typeface="Times New Roman" panose="02020603050405020304" pitchFamily="18" charset="0"/>
+              </a:rPr>
+              <a:t>sẽ được gửi trước. Ví dụ:</a:t>
+            </a:r>
+            <a:endParaRPr lang="vi-VN" sz="2000">
+              <a:latin typeface="Times New Roman" panose="02020603050405020304" pitchFamily="18" charset="0"/>
+              <a:cs typeface="Times New Roman" panose="02020603050405020304" pitchFamily="18" charset="0"/>
+            </a:endParaRPr>
+          </a:p>
+        </p:txBody>
+      </p:sp>
+      <p:sp>
+        <p:nvSpPr>
+          <p:cNvPr id="8" name="TextBox 7"/>
+          <p:cNvSpPr txBox="1"/>
+          <p:nvPr/>
+        </p:nvSpPr>
+        <p:spPr>
+          <a:xfrm>
+            <a:off x="2113009" y="1082381"/>
+            <a:ext cx="2196232" cy="477054"/>
           </a:xfrm>
           <a:prstGeom prst="rect">
             <a:avLst/>
@@ -5699,6 +5928,11 @@
           <a:solidFill>
             <a:schemeClr val="bg1"/>
           </a:solidFill>
+          <a:ln>
+            <a:solidFill>
+              <a:srgbClr val="FF0000"/>
+            </a:solidFill>
+          </a:ln>
         </p:spPr>
         <p:txBody>
           <a:bodyPr wrap="square" rtlCol="0">
@@ -5706,285 +5940,17 @@
           </a:bodyPr>
           <a:lstStyle/>
           <a:p>
-            <a:pPr marL="342900" indent="-342900">
-              <a:lnSpc>
-                <a:spcPct val="150000"/>
-              </a:lnSpc>
-              <a:buFont typeface="Arial" panose="020B0604020202020204" pitchFamily="34" charset="0"/>
-              <a:buChar char="•"/>
-            </a:pPr>
-            <a:r>
-              <a:rPr lang="vi-VN" sz="2000">
-                <a:latin typeface="Times New Roman" panose="02020603050405020304" pitchFamily="18" charset="0"/>
-                <a:cs typeface="Times New Roman" panose="02020603050405020304" pitchFamily="18" charset="0"/>
-              </a:rPr>
-              <a:t>Modbus gateway là một thiết bị cho phép chuyển đổi qua lại giữa </a:t>
-            </a:r>
-            <a:r>
-              <a:rPr lang="vi-VN" sz="2000">
-                <a:latin typeface="Times New Roman" panose="02020603050405020304" pitchFamily="18" charset="0"/>
-                <a:cs typeface="Times New Roman" panose="02020603050405020304" pitchFamily="18" charset="0"/>
-              </a:rPr>
-              <a:t>giao </a:t>
-            </a:r>
-            <a:r>
-              <a:rPr lang="vi-VN" sz="2000" smtClean="0">
-                <a:latin typeface="Times New Roman" panose="02020603050405020304" pitchFamily="18" charset="0"/>
-                <a:cs typeface="Times New Roman" panose="02020603050405020304" pitchFamily="18" charset="0"/>
-              </a:rPr>
-              <a:t>thức </a:t>
-            </a:r>
-            <a:r>
-              <a:rPr lang="vi-VN" sz="2000" b="1">
-                <a:latin typeface="Times New Roman" panose="02020603050405020304" pitchFamily="18" charset="0"/>
-                <a:cs typeface="Times New Roman" panose="02020603050405020304" pitchFamily="18" charset="0"/>
-              </a:rPr>
-              <a:t>Modbus </a:t>
-            </a:r>
-            <a:r>
-              <a:rPr lang="vi-VN" sz="2000" b="1">
-                <a:latin typeface="Times New Roman" panose="02020603050405020304" pitchFamily="18" charset="0"/>
-                <a:cs typeface="Times New Roman" panose="02020603050405020304" pitchFamily="18" charset="0"/>
-              </a:rPr>
-              <a:t>RTU </a:t>
-            </a:r>
-            <a:r>
-              <a:rPr lang="en-US" sz="2000" smtClean="0">
-                <a:latin typeface="Times New Roman" panose="02020603050405020304" pitchFamily="18" charset="0"/>
-                <a:cs typeface="Times New Roman" panose="02020603050405020304" pitchFamily="18" charset="0"/>
-              </a:rPr>
-              <a:t>và </a:t>
-            </a:r>
-            <a:r>
-              <a:rPr lang="vi-VN" sz="2000" b="1">
-                <a:latin typeface="Times New Roman" panose="02020603050405020304" pitchFamily="18" charset="0"/>
-                <a:cs typeface="Times New Roman" panose="02020603050405020304" pitchFamily="18" charset="0"/>
-              </a:rPr>
-              <a:t>Modbus </a:t>
-            </a:r>
-            <a:r>
-              <a:rPr lang="vi-VN" sz="2000" b="1" smtClean="0">
-                <a:latin typeface="Times New Roman" panose="02020603050405020304" pitchFamily="18" charset="0"/>
-                <a:cs typeface="Times New Roman" panose="02020603050405020304" pitchFamily="18" charset="0"/>
-              </a:rPr>
-              <a:t>TCP</a:t>
-            </a:r>
-            <a:r>
-              <a:rPr lang="vi-VN" sz="2000" smtClean="0">
-                <a:latin typeface="Times New Roman" panose="02020603050405020304" pitchFamily="18" charset="0"/>
-                <a:cs typeface="Times New Roman" panose="02020603050405020304" pitchFamily="18" charset="0"/>
-              </a:rPr>
-              <a:t>. </a:t>
-            </a:r>
-            <a:r>
-              <a:rPr lang="vi-VN" sz="2000">
-                <a:latin typeface="Times New Roman" panose="02020603050405020304" pitchFamily="18" charset="0"/>
-                <a:cs typeface="Times New Roman" panose="02020603050405020304" pitchFamily="18" charset="0"/>
-              </a:rPr>
-              <a:t>Thông thường thiết bị sẽ </a:t>
-            </a:r>
-            <a:r>
-              <a:rPr lang="vi-VN" sz="2000">
-                <a:latin typeface="Times New Roman" panose="02020603050405020304" pitchFamily="18" charset="0"/>
-                <a:cs typeface="Times New Roman" panose="02020603050405020304" pitchFamily="18" charset="0"/>
-              </a:rPr>
-              <a:t>có </a:t>
-            </a:r>
-            <a:r>
-              <a:rPr lang="vi-VN" sz="2000" smtClean="0">
-                <a:latin typeface="Times New Roman" panose="02020603050405020304" pitchFamily="18" charset="0"/>
-                <a:cs typeface="Times New Roman" panose="02020603050405020304" pitchFamily="18" charset="0"/>
-              </a:rPr>
-              <a:t>1 </a:t>
-            </a:r>
-            <a:r>
-              <a:rPr lang="vi-VN" sz="2000">
-                <a:latin typeface="Times New Roman" panose="02020603050405020304" pitchFamily="18" charset="0"/>
-                <a:cs typeface="Times New Roman" panose="02020603050405020304" pitchFamily="18" charset="0"/>
-              </a:rPr>
-              <a:t>cổng </a:t>
-            </a:r>
-            <a:r>
-              <a:rPr lang="vi-VN" sz="2000">
-                <a:latin typeface="Times New Roman" panose="02020603050405020304" pitchFamily="18" charset="0"/>
-                <a:cs typeface="Times New Roman" panose="02020603050405020304" pitchFamily="18" charset="0"/>
-              </a:rPr>
-              <a:t>serial </a:t>
-            </a:r>
-            <a:r>
-              <a:rPr lang="vi-VN" sz="2000" smtClean="0">
-                <a:latin typeface="Times New Roman" panose="02020603050405020304" pitchFamily="18" charset="0"/>
-                <a:cs typeface="Times New Roman" panose="02020603050405020304" pitchFamily="18" charset="0"/>
-              </a:rPr>
-              <a:t>(RS232/RS485</a:t>
-            </a:r>
-            <a:r>
-              <a:rPr lang="vi-VN" sz="2000">
-                <a:latin typeface="Times New Roman" panose="02020603050405020304" pitchFamily="18" charset="0"/>
-                <a:cs typeface="Times New Roman" panose="02020603050405020304" pitchFamily="18" charset="0"/>
-              </a:rPr>
-              <a:t>) </a:t>
-            </a:r>
-            <a:r>
-              <a:rPr lang="vi-VN" sz="2000">
-                <a:latin typeface="Times New Roman" panose="02020603050405020304" pitchFamily="18" charset="0"/>
-                <a:cs typeface="Times New Roman" panose="02020603050405020304" pitchFamily="18" charset="0"/>
-              </a:rPr>
-              <a:t>và </a:t>
-            </a:r>
-            <a:r>
-              <a:rPr lang="vi-VN" sz="2000" smtClean="0">
-                <a:latin typeface="Times New Roman" panose="02020603050405020304" pitchFamily="18" charset="0"/>
-                <a:cs typeface="Times New Roman" panose="02020603050405020304" pitchFamily="18" charset="0"/>
-              </a:rPr>
-              <a:t>1 </a:t>
-            </a:r>
-            <a:r>
-              <a:rPr lang="vi-VN" sz="2000">
-                <a:latin typeface="Times New Roman" panose="02020603050405020304" pitchFamily="18" charset="0"/>
-                <a:cs typeface="Times New Roman" panose="02020603050405020304" pitchFamily="18" charset="0"/>
-              </a:rPr>
-              <a:t>cổng </a:t>
-            </a:r>
-            <a:r>
-              <a:rPr lang="vi-VN" sz="2000">
-                <a:latin typeface="Times New Roman" panose="02020603050405020304" pitchFamily="18" charset="0"/>
-                <a:cs typeface="Times New Roman" panose="02020603050405020304" pitchFamily="18" charset="0"/>
-              </a:rPr>
-              <a:t>Ethernet</a:t>
-            </a:r>
-            <a:r>
-              <a:rPr lang="vi-VN" sz="2000" smtClean="0">
-                <a:latin typeface="Times New Roman" panose="02020603050405020304" pitchFamily="18" charset="0"/>
-                <a:cs typeface="Times New Roman" panose="02020603050405020304" pitchFamily="18" charset="0"/>
-              </a:rPr>
-              <a:t>.</a:t>
-            </a:r>
-            <a:endParaRPr lang="vi-VN" sz="2000">
+            <a:r>
+              <a:rPr lang="vi-VN" sz="2500" b="1">
+                <a:latin typeface="Times New Roman" panose="02020603050405020304" pitchFamily="18" charset="0"/>
+                <a:cs typeface="Times New Roman" panose="02020603050405020304" pitchFamily="18" charset="0"/>
+              </a:rPr>
+              <a:t>Modbus TCP:</a:t>
+            </a:r>
+            <a:endParaRPr lang="en-US" sz="2500" b="1">
               <a:latin typeface="Times New Roman" panose="02020603050405020304" pitchFamily="18" charset="0"/>
               <a:cs typeface="Times New Roman" panose="02020603050405020304" pitchFamily="18" charset="0"/>
             </a:endParaRPr>
-          </a:p>
-          <a:p>
-            <a:pPr marL="342900" indent="-342900">
-              <a:lnSpc>
-                <a:spcPct val="150000"/>
-              </a:lnSpc>
-              <a:buFont typeface="Arial" panose="020B0604020202020204" pitchFamily="34" charset="0"/>
-              <a:buChar char="•"/>
-            </a:pPr>
-            <a:r>
-              <a:rPr lang="vi-VN" sz="2000">
-                <a:latin typeface="Times New Roman" panose="02020603050405020304" pitchFamily="18" charset="0"/>
-                <a:cs typeface="Times New Roman" panose="02020603050405020304" pitchFamily="18" charset="0"/>
-              </a:rPr>
-              <a:t>Tại sao lại là 2 giao thức này? vì hai giao thức này phổ biến, đại diện cho 02 loại cổng vật lý là serial (RS232/RS485) và ethernet (cổng RJ45</a:t>
-            </a:r>
-            <a:r>
-              <a:rPr lang="vi-VN" sz="2000">
-                <a:latin typeface="Times New Roman" panose="02020603050405020304" pitchFamily="18" charset="0"/>
-                <a:cs typeface="Times New Roman" panose="02020603050405020304" pitchFamily="18" charset="0"/>
-              </a:rPr>
-              <a:t>). </a:t>
-            </a:r>
-            <a:r>
-              <a:rPr lang="en-US" sz="2000">
-                <a:latin typeface="Times New Roman" panose="02020603050405020304" pitchFamily="18" charset="0"/>
-                <a:cs typeface="Times New Roman" panose="02020603050405020304" pitchFamily="18" charset="0"/>
-              </a:rPr>
-              <a:t>N</a:t>
-            </a:r>
-            <a:r>
-              <a:rPr lang="vi-VN" sz="2000" smtClean="0">
-                <a:latin typeface="Times New Roman" panose="02020603050405020304" pitchFamily="18" charset="0"/>
-                <a:cs typeface="Times New Roman" panose="02020603050405020304" pitchFamily="18" charset="0"/>
-              </a:rPr>
-              <a:t>hiều </a:t>
-            </a:r>
-            <a:r>
-              <a:rPr lang="vi-VN" sz="2000">
-                <a:latin typeface="Times New Roman" panose="02020603050405020304" pitchFamily="18" charset="0"/>
-                <a:cs typeface="Times New Roman" panose="02020603050405020304" pitchFamily="18" charset="0"/>
-              </a:rPr>
-              <a:t>thiết </a:t>
-            </a:r>
-            <a:r>
-              <a:rPr lang="vi-VN" sz="2000">
-                <a:latin typeface="Times New Roman" panose="02020603050405020304" pitchFamily="18" charset="0"/>
-                <a:cs typeface="Times New Roman" panose="02020603050405020304" pitchFamily="18" charset="0"/>
-              </a:rPr>
-              <a:t>bị </a:t>
-            </a:r>
-            <a:r>
-              <a:rPr lang="vi-VN" sz="2000">
-                <a:latin typeface="Times New Roman" panose="02020603050405020304" pitchFamily="18" charset="0"/>
-                <a:cs typeface="Times New Roman" panose="02020603050405020304" pitchFamily="18" charset="0"/>
-              </a:rPr>
-              <a:t>công nghiệp </a:t>
-            </a:r>
-            <a:r>
-              <a:rPr lang="vi-VN" sz="2000">
-                <a:latin typeface="Times New Roman" panose="02020603050405020304" pitchFamily="18" charset="0"/>
-                <a:cs typeface="Times New Roman" panose="02020603050405020304" pitchFamily="18" charset="0"/>
-              </a:rPr>
-              <a:t>hiện </a:t>
-            </a:r>
-            <a:r>
-              <a:rPr lang="vi-VN" sz="2000" smtClean="0">
-                <a:latin typeface="Times New Roman" panose="02020603050405020304" pitchFamily="18" charset="0"/>
-                <a:cs typeface="Times New Roman" panose="02020603050405020304" pitchFamily="18" charset="0"/>
-              </a:rPr>
-              <a:t>nay chỉ </a:t>
-            </a:r>
-            <a:r>
-              <a:rPr lang="vi-VN" sz="2000">
-                <a:latin typeface="Times New Roman" panose="02020603050405020304" pitchFamily="18" charset="0"/>
-                <a:cs typeface="Times New Roman" panose="02020603050405020304" pitchFamily="18" charset="0"/>
-              </a:rPr>
-              <a:t>hỗ trợ Modbus RTU, hoặc chỉ hỗ trợ Modbus TCP, hoặc hỗ trợ cả 2. Do đó, để kết nối các thiết </a:t>
-            </a:r>
-            <a:r>
-              <a:rPr lang="vi-VN" sz="2000">
-                <a:latin typeface="Times New Roman" panose="02020603050405020304" pitchFamily="18" charset="0"/>
-                <a:cs typeface="Times New Roman" panose="02020603050405020304" pitchFamily="18" charset="0"/>
-              </a:rPr>
-              <a:t>bị </a:t>
-            </a:r>
-            <a:r>
-              <a:rPr lang="vi-VN" sz="2000" smtClean="0">
-                <a:latin typeface="Times New Roman" panose="02020603050405020304" pitchFamily="18" charset="0"/>
-                <a:cs typeface="Times New Roman" panose="02020603050405020304" pitchFamily="18" charset="0"/>
-              </a:rPr>
-              <a:t>này </a:t>
-            </a:r>
-            <a:r>
-              <a:rPr lang="vi-VN" sz="2000">
-                <a:latin typeface="Times New Roman" panose="02020603050405020304" pitchFamily="18" charset="0"/>
-                <a:cs typeface="Times New Roman" panose="02020603050405020304" pitchFamily="18" charset="0"/>
-              </a:rPr>
-              <a:t>vào hệ thống modbus chung của nhà máy, xí nghiệp thì sẽ </a:t>
-            </a:r>
-            <a:r>
-              <a:rPr lang="vi-VN" sz="2000">
-                <a:latin typeface="Times New Roman" panose="02020603050405020304" pitchFamily="18" charset="0"/>
-                <a:cs typeface="Times New Roman" panose="02020603050405020304" pitchFamily="18" charset="0"/>
-              </a:rPr>
-              <a:t>cần </a:t>
-            </a:r>
-            <a:r>
-              <a:rPr lang="vi-VN" sz="2000" smtClean="0">
-                <a:latin typeface="Times New Roman" panose="02020603050405020304" pitchFamily="18" charset="0"/>
-                <a:cs typeface="Times New Roman" panose="02020603050405020304" pitchFamily="18" charset="0"/>
-              </a:rPr>
-              <a:t>1 </a:t>
-            </a:r>
-            <a:r>
-              <a:rPr lang="vi-VN" sz="2000">
-                <a:latin typeface="Times New Roman" panose="02020603050405020304" pitchFamily="18" charset="0"/>
-                <a:cs typeface="Times New Roman" panose="02020603050405020304" pitchFamily="18" charset="0"/>
-              </a:rPr>
-              <a:t>thiết bị phiên dịch được gọi là Modbus Gateway. </a:t>
-            </a:r>
           </a:p>
         </p:txBody>
       </p:sp>
@@ -6004,32 +5970,8 @@
         </p:blipFill>
         <p:spPr>
           <a:xfrm>
-            <a:off x="2722181" y="4371975"/>
-            <a:ext cx="2905125" cy="2486025"/>
-          </a:xfrm>
-          <a:prstGeom prst="rect">
-            <a:avLst/>
-          </a:prstGeom>
-        </p:spPr>
-      </p:pic>
-      <p:pic>
-        <p:nvPicPr>
-          <p:cNvPr id="11" name="Picture 10"/>
-          <p:cNvPicPr>
-            <a:picLocks noChangeAspect="1"/>
-          </p:cNvPicPr>
-          <p:nvPr/>
-        </p:nvPicPr>
-        <p:blipFill>
-          <a:blip r:embed="rId3"/>
-          <a:stretch>
-            <a:fillRect/>
-          </a:stretch>
-        </p:blipFill>
-        <p:spPr>
-          <a:xfrm>
-            <a:off x="7834477" y="4371975"/>
-            <a:ext cx="3333750" cy="2209800"/>
+            <a:off x="2113009" y="3928906"/>
+            <a:ext cx="9868782" cy="1305246"/>
           </a:xfrm>
           <a:prstGeom prst="rect">
             <a:avLst/>
@@ -6039,7 +5981,7 @@
     </p:spTree>
     <p:extLst>
       <p:ext uri="{BB962C8B-B14F-4D97-AF65-F5344CB8AC3E}">
-        <p14:creationId xmlns:p14="http://schemas.microsoft.com/office/powerpoint/2010/main" val="2074553502"/>
+        <p14:creationId xmlns:p14="http://schemas.microsoft.com/office/powerpoint/2010/main" val="1564357153"/>
       </p:ext>
     </p:extLst>
   </p:cSld>
@@ -6081,8 +6023,8 @@
         </p:nvSpPr>
         <p:spPr>
           <a:xfrm>
-            <a:off x="2769477" y="777765"/>
-            <a:ext cx="8261130" cy="861774"/>
+            <a:off x="4461641" y="105103"/>
+            <a:ext cx="5150069" cy="861774"/>
           </a:xfrm>
           <a:prstGeom prst="rect">
             <a:avLst/>
@@ -6103,37 +6045,7 @@
                 <a:latin typeface="Times New Roman" panose="02020603050405020304" pitchFamily="18" charset="0"/>
                 <a:cs typeface="Times New Roman" panose="02020603050405020304" pitchFamily="18" charset="0"/>
               </a:rPr>
-              <a:t>Analog </a:t>
-            </a:r>
-            <a:r>
-              <a:rPr lang="en-US" sz="5000" b="1">
-                <a:solidFill>
-                  <a:srgbClr val="FF0000"/>
-                </a:solidFill>
-                <a:latin typeface="Times New Roman" panose="02020603050405020304" pitchFamily="18" charset="0"/>
-                <a:cs typeface="Times New Roman" panose="02020603050405020304" pitchFamily="18" charset="0"/>
-              </a:rPr>
-              <a:t>to </a:t>
-            </a:r>
-            <a:r>
-              <a:rPr lang="en-US" sz="5000" b="1" smtClean="0">
-                <a:solidFill>
-                  <a:srgbClr val="FF0000"/>
-                </a:solidFill>
-                <a:latin typeface="Times New Roman" panose="02020603050405020304" pitchFamily="18" charset="0"/>
-                <a:cs typeface="Times New Roman" panose="02020603050405020304" pitchFamily="18" charset="0"/>
-              </a:rPr>
-              <a:t>M</a:t>
-            </a:r>
-            <a:r>
-              <a:rPr lang="en-US" sz="5000" b="1" smtClean="0">
-                <a:solidFill>
-                  <a:srgbClr val="FF0000"/>
-                </a:solidFill>
-                <a:latin typeface="Times New Roman" panose="02020603050405020304" pitchFamily="18" charset="0"/>
-                <a:cs typeface="Times New Roman" panose="02020603050405020304" pitchFamily="18" charset="0"/>
-              </a:rPr>
-              <a:t>odbus Converter</a:t>
+              <a:t>ModBus Gateway</a:t>
             </a:r>
             <a:endParaRPr lang="en-US" sz="5000" b="1">
               <a:solidFill>
@@ -6153,8 +6065,8 @@
         </p:nvSpPr>
         <p:spPr>
           <a:xfrm>
-            <a:off x="1881353" y="1823470"/>
-            <a:ext cx="10037378" cy="1883657"/>
+            <a:off x="1797270" y="966877"/>
+            <a:ext cx="10037378" cy="3323987"/>
           </a:xfrm>
           <a:prstGeom prst="rect">
             <a:avLst/>
@@ -6181,7 +6093,209 @@
                 <a:latin typeface="Times New Roman" panose="02020603050405020304" pitchFamily="18" charset="0"/>
                 <a:cs typeface="Times New Roman" panose="02020603050405020304" pitchFamily="18" charset="0"/>
               </a:rPr>
-              <a:t>Giao thức modbus đã được sử dụng rất nhiều hiện nay. Lý do là vì những ưu điểm của nó như: tốc độ truyền dữ liệu nhanh, khoảng cách truyền đi xa, độ chính xác rất cao, tiết kiệm chi phí….. Để đáp ứng nhu cầu này, các nhà sản xuất đã lần lượt cho ra đời các thiết bị chuyển đổi tín hiệu từ 4-20mA hoặc 0-10V về dạng Modbus RTU.</a:t>
+              <a:t>Modbus gateway là một thiết bị cho phép chuyển đổi qua lại giữa giao </a:t>
+            </a:r>
+            <a:r>
+              <a:rPr lang="vi-VN" sz="2000" smtClean="0">
+                <a:latin typeface="Times New Roman" panose="02020603050405020304" pitchFamily="18" charset="0"/>
+                <a:cs typeface="Times New Roman" panose="02020603050405020304" pitchFamily="18" charset="0"/>
+              </a:rPr>
+              <a:t>thức </a:t>
+            </a:r>
+            <a:r>
+              <a:rPr lang="vi-VN" sz="2000" b="1">
+                <a:latin typeface="Times New Roman" panose="02020603050405020304" pitchFamily="18" charset="0"/>
+                <a:cs typeface="Times New Roman" panose="02020603050405020304" pitchFamily="18" charset="0"/>
+              </a:rPr>
+              <a:t>Modbus RTU </a:t>
+            </a:r>
+            <a:r>
+              <a:rPr lang="en-US" sz="2000" smtClean="0">
+                <a:latin typeface="Times New Roman" panose="02020603050405020304" pitchFamily="18" charset="0"/>
+                <a:cs typeface="Times New Roman" panose="02020603050405020304" pitchFamily="18" charset="0"/>
+              </a:rPr>
+              <a:t>và </a:t>
+            </a:r>
+            <a:r>
+              <a:rPr lang="vi-VN" sz="2000" b="1">
+                <a:latin typeface="Times New Roman" panose="02020603050405020304" pitchFamily="18" charset="0"/>
+                <a:cs typeface="Times New Roman" panose="02020603050405020304" pitchFamily="18" charset="0"/>
+              </a:rPr>
+              <a:t>Modbus </a:t>
+            </a:r>
+            <a:r>
+              <a:rPr lang="vi-VN" sz="2000" b="1" smtClean="0">
+                <a:latin typeface="Times New Roman" panose="02020603050405020304" pitchFamily="18" charset="0"/>
+                <a:cs typeface="Times New Roman" panose="02020603050405020304" pitchFamily="18" charset="0"/>
+              </a:rPr>
+              <a:t>TCP</a:t>
+            </a:r>
+            <a:r>
+              <a:rPr lang="vi-VN" sz="2000" smtClean="0">
+                <a:latin typeface="Times New Roman" panose="02020603050405020304" pitchFamily="18" charset="0"/>
+                <a:cs typeface="Times New Roman" panose="02020603050405020304" pitchFamily="18" charset="0"/>
+              </a:rPr>
+              <a:t>. </a:t>
+            </a:r>
+            <a:r>
+              <a:rPr lang="vi-VN" sz="2000">
+                <a:latin typeface="Times New Roman" panose="02020603050405020304" pitchFamily="18" charset="0"/>
+                <a:cs typeface="Times New Roman" panose="02020603050405020304" pitchFamily="18" charset="0"/>
+              </a:rPr>
+              <a:t>Thông thường thiết bị sẽ có </a:t>
+            </a:r>
+            <a:r>
+              <a:rPr lang="vi-VN" sz="2000" smtClean="0">
+                <a:latin typeface="Times New Roman" panose="02020603050405020304" pitchFamily="18" charset="0"/>
+                <a:cs typeface="Times New Roman" panose="02020603050405020304" pitchFamily="18" charset="0"/>
+              </a:rPr>
+              <a:t>1 </a:t>
+            </a:r>
+            <a:r>
+              <a:rPr lang="vi-VN" sz="2000">
+                <a:latin typeface="Times New Roman" panose="02020603050405020304" pitchFamily="18" charset="0"/>
+                <a:cs typeface="Times New Roman" panose="02020603050405020304" pitchFamily="18" charset="0"/>
+              </a:rPr>
+              <a:t>cổng serial </a:t>
+            </a:r>
+            <a:r>
+              <a:rPr lang="vi-VN" sz="2000" smtClean="0">
+                <a:latin typeface="Times New Roman" panose="02020603050405020304" pitchFamily="18" charset="0"/>
+                <a:cs typeface="Times New Roman" panose="02020603050405020304" pitchFamily="18" charset="0"/>
+              </a:rPr>
+              <a:t>(RS232/RS485</a:t>
+            </a:r>
+            <a:r>
+              <a:rPr lang="vi-VN" sz="2000">
+                <a:latin typeface="Times New Roman" panose="02020603050405020304" pitchFamily="18" charset="0"/>
+                <a:cs typeface="Times New Roman" panose="02020603050405020304" pitchFamily="18" charset="0"/>
+              </a:rPr>
+              <a:t>) và </a:t>
+            </a:r>
+            <a:r>
+              <a:rPr lang="vi-VN" sz="2000" smtClean="0">
+                <a:latin typeface="Times New Roman" panose="02020603050405020304" pitchFamily="18" charset="0"/>
+                <a:cs typeface="Times New Roman" panose="02020603050405020304" pitchFamily="18" charset="0"/>
+              </a:rPr>
+              <a:t>1 </a:t>
+            </a:r>
+            <a:r>
+              <a:rPr lang="vi-VN" sz="2000">
+                <a:latin typeface="Times New Roman" panose="02020603050405020304" pitchFamily="18" charset="0"/>
+                <a:cs typeface="Times New Roman" panose="02020603050405020304" pitchFamily="18" charset="0"/>
+              </a:rPr>
+              <a:t>cổng Ethernet</a:t>
+            </a:r>
+            <a:r>
+              <a:rPr lang="vi-VN" sz="2000" smtClean="0">
+                <a:latin typeface="Times New Roman" panose="02020603050405020304" pitchFamily="18" charset="0"/>
+                <a:cs typeface="Times New Roman" panose="02020603050405020304" pitchFamily="18" charset="0"/>
+              </a:rPr>
+              <a:t>.</a:t>
+            </a:r>
+            <a:endParaRPr lang="vi-VN" sz="2000">
+              <a:latin typeface="Times New Roman" panose="02020603050405020304" pitchFamily="18" charset="0"/>
+              <a:cs typeface="Times New Roman" panose="02020603050405020304" pitchFamily="18" charset="0"/>
+            </a:endParaRPr>
+          </a:p>
+          <a:p>
+            <a:pPr marL="342900" indent="-342900">
+              <a:lnSpc>
+                <a:spcPct val="150000"/>
+              </a:lnSpc>
+              <a:buFont typeface="Arial" panose="020B0604020202020204" pitchFamily="34" charset="0"/>
+              <a:buChar char="•"/>
+            </a:pPr>
+            <a:r>
+              <a:rPr lang="vi-VN" sz="2000">
+                <a:latin typeface="Times New Roman" panose="02020603050405020304" pitchFamily="18" charset="0"/>
+                <a:cs typeface="Times New Roman" panose="02020603050405020304" pitchFamily="18" charset="0"/>
+              </a:rPr>
+              <a:t>Tại sao lại là 2 giao thức này? </a:t>
+            </a:r>
+            <a:r>
+              <a:rPr lang="en-US" sz="2000" smtClean="0">
+                <a:latin typeface="Times New Roman" panose="02020603050405020304" pitchFamily="18" charset="0"/>
+                <a:cs typeface="Times New Roman" panose="02020603050405020304" pitchFamily="18" charset="0"/>
+              </a:rPr>
+              <a:t>V</a:t>
+            </a:r>
+            <a:r>
+              <a:rPr lang="vi-VN" sz="2000" smtClean="0">
+                <a:latin typeface="Times New Roman" panose="02020603050405020304" pitchFamily="18" charset="0"/>
+                <a:cs typeface="Times New Roman" panose="02020603050405020304" pitchFamily="18" charset="0"/>
+              </a:rPr>
+              <a:t>ì </a:t>
+            </a:r>
+            <a:r>
+              <a:rPr lang="vi-VN" sz="2000">
+                <a:latin typeface="Times New Roman" panose="02020603050405020304" pitchFamily="18" charset="0"/>
+                <a:cs typeface="Times New Roman" panose="02020603050405020304" pitchFamily="18" charset="0"/>
+              </a:rPr>
+              <a:t>hai giao thức này phổ biến, đại diện cho 02 loại cổng vật lý là serial (RS232/RS485) và ethernet (cổng RJ45). </a:t>
+            </a:r>
+            <a:r>
+              <a:rPr lang="en-US" sz="2000">
+                <a:latin typeface="Times New Roman" panose="02020603050405020304" pitchFamily="18" charset="0"/>
+                <a:cs typeface="Times New Roman" panose="02020603050405020304" pitchFamily="18" charset="0"/>
+              </a:rPr>
+              <a:t>N</a:t>
+            </a:r>
+            <a:r>
+              <a:rPr lang="vi-VN" sz="2000" smtClean="0">
+                <a:latin typeface="Times New Roman" panose="02020603050405020304" pitchFamily="18" charset="0"/>
+                <a:cs typeface="Times New Roman" panose="02020603050405020304" pitchFamily="18" charset="0"/>
+              </a:rPr>
+              <a:t>hiều </a:t>
+            </a:r>
+            <a:r>
+              <a:rPr lang="vi-VN" sz="2000">
+                <a:latin typeface="Times New Roman" panose="02020603050405020304" pitchFamily="18" charset="0"/>
+                <a:cs typeface="Times New Roman" panose="02020603050405020304" pitchFamily="18" charset="0"/>
+              </a:rPr>
+              <a:t>thiết bị công nghiệp hiện </a:t>
+            </a:r>
+            <a:r>
+              <a:rPr lang="vi-VN" sz="2000" smtClean="0">
+                <a:latin typeface="Times New Roman" panose="02020603050405020304" pitchFamily="18" charset="0"/>
+                <a:cs typeface="Times New Roman" panose="02020603050405020304" pitchFamily="18" charset="0"/>
+              </a:rPr>
+              <a:t>nay chỉ </a:t>
+            </a:r>
+            <a:r>
+              <a:rPr lang="vi-VN" sz="2000">
+                <a:latin typeface="Times New Roman" panose="02020603050405020304" pitchFamily="18" charset="0"/>
+                <a:cs typeface="Times New Roman" panose="02020603050405020304" pitchFamily="18" charset="0"/>
+              </a:rPr>
+              <a:t>hỗ trợ Modbus RTU, hoặc chỉ hỗ trợ Modbus TCP, hoặc hỗ trợ cả 2. Do đó, để kết nối các thiết bị </a:t>
+            </a:r>
+            <a:r>
+              <a:rPr lang="vi-VN" sz="2000" smtClean="0">
+                <a:latin typeface="Times New Roman" panose="02020603050405020304" pitchFamily="18" charset="0"/>
+                <a:cs typeface="Times New Roman" panose="02020603050405020304" pitchFamily="18" charset="0"/>
+              </a:rPr>
+              <a:t>này </a:t>
+            </a:r>
+            <a:r>
+              <a:rPr lang="vi-VN" sz="2000">
+                <a:latin typeface="Times New Roman" panose="02020603050405020304" pitchFamily="18" charset="0"/>
+                <a:cs typeface="Times New Roman" panose="02020603050405020304" pitchFamily="18" charset="0"/>
+              </a:rPr>
+              <a:t>vào hệ thống modbus chung của nhà máy, xí nghiệp thì sẽ cần </a:t>
+            </a:r>
+            <a:r>
+              <a:rPr lang="vi-VN" sz="2000" smtClean="0">
+                <a:latin typeface="Times New Roman" panose="02020603050405020304" pitchFamily="18" charset="0"/>
+                <a:cs typeface="Times New Roman" panose="02020603050405020304" pitchFamily="18" charset="0"/>
+              </a:rPr>
+              <a:t>1 </a:t>
+            </a:r>
+            <a:r>
+              <a:rPr lang="vi-VN" sz="2000">
+                <a:latin typeface="Times New Roman" panose="02020603050405020304" pitchFamily="18" charset="0"/>
+                <a:cs typeface="Times New Roman" panose="02020603050405020304" pitchFamily="18" charset="0"/>
+              </a:rPr>
+              <a:t>thiết bị phiên dịch được gọi là Modbus Gateway. </a:t>
             </a:r>
           </a:p>
         </p:txBody>
@@ -6202,8 +6316,32 @@
         </p:blipFill>
         <p:spPr>
           <a:xfrm>
-            <a:off x="4418779" y="3895725"/>
-            <a:ext cx="4962525" cy="2962275"/>
+            <a:off x="2722181" y="4371975"/>
+            <a:ext cx="2905125" cy="2486025"/>
+          </a:xfrm>
+          <a:prstGeom prst="rect">
+            <a:avLst/>
+          </a:prstGeom>
+        </p:spPr>
+      </p:pic>
+      <p:pic>
+        <p:nvPicPr>
+          <p:cNvPr id="11" name="Picture 10"/>
+          <p:cNvPicPr>
+            <a:picLocks noChangeAspect="1"/>
+          </p:cNvPicPr>
+          <p:nvPr/>
+        </p:nvPicPr>
+        <p:blipFill>
+          <a:blip r:embed="rId3"/>
+          <a:stretch>
+            <a:fillRect/>
+          </a:stretch>
+        </p:blipFill>
+        <p:spPr>
+          <a:xfrm>
+            <a:off x="7834477" y="4371975"/>
+            <a:ext cx="3333750" cy="2209800"/>
           </a:xfrm>
           <a:prstGeom prst="rect">
             <a:avLst/>
@@ -6213,7 +6351,7 @@
     </p:spTree>
     <p:extLst>
       <p:ext uri="{BB962C8B-B14F-4D97-AF65-F5344CB8AC3E}">
-        <p14:creationId xmlns:p14="http://schemas.microsoft.com/office/powerpoint/2010/main" val="124631553"/>
+        <p14:creationId xmlns:p14="http://schemas.microsoft.com/office/powerpoint/2010/main" val="2074553502"/>
       </p:ext>
     </p:extLst>
   </p:cSld>
@@ -6297,17 +6435,7 @@
                 <a:latin typeface="Times New Roman" panose="02020603050405020304" pitchFamily="18" charset="0"/>
                 <a:cs typeface="Times New Roman" panose="02020603050405020304" pitchFamily="18" charset="0"/>
               </a:rPr>
-              <a:t>M</a:t>
-            </a:r>
-            <a:r>
-              <a:rPr lang="en-US" sz="5000" b="1" smtClean="0">
-                <a:solidFill>
-                  <a:srgbClr val="FF0000"/>
-                </a:solidFill>
-                <a:latin typeface="Times New Roman" panose="02020603050405020304" pitchFamily="18" charset="0"/>
-                <a:cs typeface="Times New Roman" panose="02020603050405020304" pitchFamily="18" charset="0"/>
-              </a:rPr>
-              <a:t>odbus Converter</a:t>
+              <a:t>Modbus Converter</a:t>
             </a:r>
             <a:endParaRPr lang="en-US" sz="5000" b="1">
               <a:solidFill>
@@ -6327,8 +6455,8 @@
         </p:nvSpPr>
         <p:spPr>
           <a:xfrm>
-            <a:off x="1881353" y="4679334"/>
-            <a:ext cx="10037378" cy="1421992"/>
+            <a:off x="1881353" y="1823470"/>
+            <a:ext cx="10037378" cy="1883657"/>
           </a:xfrm>
           <a:prstGeom prst="rect">
             <a:avLst/>
@@ -6343,38 +6471,26 @@
           </a:bodyPr>
           <a:lstStyle/>
           <a:p>
-            <a:pPr>
+            <a:pPr marL="342900" indent="-342900">
               <a:lnSpc>
                 <a:spcPct val="150000"/>
               </a:lnSpc>
+              <a:buFont typeface="Arial" panose="020B0604020202020204" pitchFamily="34" charset="0"/>
+              <a:buChar char="•"/>
             </a:pPr>
             <a:r>
               <a:rPr lang="vi-VN" sz="2000">
                 <a:latin typeface="Times New Roman" panose="02020603050405020304" pitchFamily="18" charset="0"/>
                 <a:cs typeface="Times New Roman" panose="02020603050405020304" pitchFamily="18" charset="0"/>
               </a:rPr>
-              <a:t>Như hình trên, chúng ta có thể thấy chỉ với một thiết bị chuyển đổi nhưng đồng thời có thể đọc được đến 8 ngõ vào 4-20mA/0-10V. Và chuyển chúng về tín hiệu </a:t>
-            </a:r>
-            <a:r>
-              <a:rPr lang="vi-VN" sz="2000" b="1">
-                <a:latin typeface="Times New Roman" panose="02020603050405020304" pitchFamily="18" charset="0"/>
-                <a:cs typeface="Times New Roman" panose="02020603050405020304" pitchFamily="18" charset="0"/>
-              </a:rPr>
-              <a:t>modbus RTU</a:t>
-            </a:r>
-            <a:r>
-              <a:rPr lang="vi-VN" sz="2000">
-                <a:latin typeface="Times New Roman" panose="02020603050405020304" pitchFamily="18" charset="0"/>
-                <a:cs typeface="Times New Roman" panose="02020603050405020304" pitchFamily="18" charset="0"/>
-              </a:rPr>
-              <a:t> đưa về PLC điều khiển. Đây có thể được xem là một giải pháp tiết kiệm chi phí và đem lại hiệu quả rất cao.</a:t>
+              <a:t>Giao thức modbus đã được sử dụng rất nhiều hiện nay. Lý do là vì những ưu điểm của nó như: tốc độ truyền dữ liệu nhanh, khoảng cách truyền đi xa, độ chính xác rất cao, tiết kiệm chi phí….. Để đáp ứng nhu cầu này, các nhà sản xuất đã lần lượt cho ra đời các thiết bị chuyển đổi tín hiệu từ 4-20mA hoặc 0-10V về dạng Modbus RTU.</a:t>
             </a:r>
           </a:p>
         </p:txBody>
       </p:sp>
       <p:pic>
         <p:nvPicPr>
-          <p:cNvPr id="8" name="Picture 7"/>
+          <p:cNvPr id="10" name="Picture 9"/>
           <p:cNvPicPr>
             <a:picLocks noChangeAspect="1"/>
           </p:cNvPicPr>
@@ -6388,8 +6504,8 @@
         </p:blipFill>
         <p:spPr>
           <a:xfrm>
-            <a:off x="4213223" y="1832750"/>
-            <a:ext cx="5373638" cy="2653373"/>
+            <a:off x="4418779" y="3895725"/>
+            <a:ext cx="4962525" cy="2962275"/>
           </a:xfrm>
           <a:prstGeom prst="rect">
             <a:avLst/>
@@ -6399,7 +6515,7 @@
     </p:spTree>
     <p:extLst>
       <p:ext uri="{BB962C8B-B14F-4D97-AF65-F5344CB8AC3E}">
-        <p14:creationId xmlns:p14="http://schemas.microsoft.com/office/powerpoint/2010/main" val="4289905795"/>
+        <p14:creationId xmlns:p14="http://schemas.microsoft.com/office/powerpoint/2010/main" val="124631553"/>
       </p:ext>
     </p:extLst>
   </p:cSld>

</xml_diff>